<commit_message>
added poster and presentation, among other things...
</commit_message>
<xml_diff>
--- a/manuscript/text/figure2.pptx
+++ b/manuscript/text/figure2.pptx
@@ -5926,7 +5926,28 @@
                   <a:latin typeface="Helvetica"/>
                   <a:cs typeface="Helvetica"/>
                 </a:rPr>
-                <a:t>Pearson Correlation (R)</a:t>
+                <a:t>Pearson Correlation </a:t>
+              </a:r>
+              <a:r>
+                <a:rPr lang="en-US" sz="1500" dirty="0" smtClean="0">
+                  <a:latin typeface="Helvetica"/>
+                  <a:cs typeface="Helvetica"/>
+                </a:rPr>
+                <a:t>(</a:t>
+              </a:r>
+              <a:r>
+                <a:rPr lang="en-US" sz="1500" dirty="0" smtClean="0">
+                  <a:latin typeface="Helvetica"/>
+                  <a:cs typeface="Helvetica"/>
+                </a:rPr>
+                <a:t>R</a:t>
+              </a:r>
+              <a:r>
+                <a:rPr lang="en-US" sz="1500" dirty="0" smtClean="0">
+                  <a:latin typeface="Helvetica"/>
+                  <a:cs typeface="Helvetica"/>
+                </a:rPr>
+                <a:t>)</a:t>
               </a:r>
               <a:endParaRPr lang="en-US" sz="1500" dirty="0">
                 <a:latin typeface="Helvetica"/>
@@ -5962,7 +5983,28 @@
                   <a:latin typeface="Helvetica"/>
                   <a:cs typeface="Helvetica"/>
                 </a:rPr>
-                <a:t>Pearson Correlation (R)</a:t>
+                <a:t>Pearson Correlation </a:t>
+              </a:r>
+              <a:r>
+                <a:rPr lang="en-US" sz="1500" dirty="0" smtClean="0">
+                  <a:latin typeface="Helvetica"/>
+                  <a:cs typeface="Helvetica"/>
+                </a:rPr>
+                <a:t>(</a:t>
+              </a:r>
+              <a:r>
+                <a:rPr lang="en-US" sz="1500" dirty="0" smtClean="0">
+                  <a:latin typeface="Helvetica"/>
+                  <a:cs typeface="Helvetica"/>
+                </a:rPr>
+                <a:t>R</a:t>
+              </a:r>
+              <a:r>
+                <a:rPr lang="en-US" sz="1500" dirty="0" smtClean="0">
+                  <a:latin typeface="Helvetica"/>
+                  <a:cs typeface="Helvetica"/>
+                </a:rPr>
+                <a:t>)</a:t>
               </a:r>
               <a:endParaRPr lang="en-US" sz="1500" dirty="0">
                 <a:latin typeface="Helvetica"/>
@@ -5998,7 +6040,28 @@
                   <a:latin typeface="Helvetica"/>
                   <a:cs typeface="Helvetica"/>
                 </a:rPr>
-                <a:t>Pearson Correlation (R)</a:t>
+                <a:t>Pearson Correlation </a:t>
+              </a:r>
+              <a:r>
+                <a:rPr lang="en-US" sz="1500" dirty="0" smtClean="0">
+                  <a:latin typeface="Helvetica"/>
+                  <a:cs typeface="Helvetica"/>
+                </a:rPr>
+                <a:t>(</a:t>
+              </a:r>
+              <a:r>
+                <a:rPr lang="en-US" sz="1500" dirty="0" smtClean="0">
+                  <a:latin typeface="Helvetica"/>
+                  <a:cs typeface="Helvetica"/>
+                </a:rPr>
+                <a:t>R</a:t>
+              </a:r>
+              <a:r>
+                <a:rPr lang="en-US" sz="1500" dirty="0" smtClean="0">
+                  <a:latin typeface="Helvetica"/>
+                  <a:cs typeface="Helvetica"/>
+                </a:rPr>
+                <a:t>)</a:t>
               </a:r>
               <a:endParaRPr lang="en-US" sz="1500" dirty="0">
                 <a:latin typeface="Helvetica"/>

</xml_diff>